<commit_message>
Donut Chart is created
</commit_message>
<xml_diff>
--- a/Project_2_Proposal.pptx
+++ b/Project_2_Proposal.pptx
@@ -1,6 +1,6 @@
 
 <file path=ppt/presentation.xml><?xml version="1.0" encoding="utf-8"?>
-<p:presentation xmlns:a="http://schemas.openxmlformats.org/drawingml/2006/main" xmlns:r="http://schemas.openxmlformats.org/officeDocument/2006/relationships" xmlns:mc="http://schemas.openxmlformats.org/markup-compatibility/2006" xmlns:mv="urn:schemas-microsoft-com:mac:vml" xmlns:p="http://schemas.openxmlformats.org/presentationml/2006/main" xmlns:c="http://schemas.openxmlformats.org/drawingml/2006/chart" xmlns:dgm="http://schemas.openxmlformats.org/drawingml/2006/diagram" xmlns:o="urn:schemas-microsoft-com:office:office" xmlns:v="urn:schemas-microsoft-com:vml" xmlns:pvml="urn:schemas-microsoft-com:office:powerpoint" xmlns:com="http://schemas.openxmlformats.org/drawingml/2006/compatibility" xmlns:p14="http://schemas.microsoft.com/office/powerpoint/2010/main" xmlns:p15="http://schemas.microsoft.com/office/powerpoint/2012/main" xmlns:ahyp="http://schemas.microsoft.com/office/drawing/2018/hyperlinkcolor" autoCompressPictures="0" embedTrueTypeFonts="1" strictFirstAndLastChars="0" saveSubsetFonts="1">
+<p:presentation xmlns:a="http://schemas.openxmlformats.org/drawingml/2006/main" xmlns:r="http://schemas.openxmlformats.org/officeDocument/2006/relationships" xmlns:mc="http://schemas.openxmlformats.org/markup-compatibility/2006" xmlns:mv="urn:schemas-microsoft-com:mac:vml" xmlns:p="http://schemas.openxmlformats.org/presentationml/2006/main" xmlns:c="http://schemas.openxmlformats.org/drawingml/2006/chart" xmlns:dgm="http://schemas.openxmlformats.org/drawingml/2006/diagram" xmlns:o="urn:schemas-microsoft-com:office:office" xmlns:v="urn:schemas-microsoft-com:vml" xmlns:pvml="urn:schemas-microsoft-com:office:powerpoint" xmlns:com="http://schemas.openxmlformats.org/drawingml/2006/compatibility" xmlns:p14="http://schemas.microsoft.com/office/powerpoint/2010/main" xmlns:p15="http://schemas.microsoft.com/office/powerpoint/2012/main" xmlns:ahyp="http://schemas.microsoft.com/office/drawing/2018/hyperlinkcolor" autoCompressPictures="0" strictFirstAndLastChars="0" saveSubsetFonts="1">
   <p:sldMasterIdLst>
     <p:sldMasterId id="2147483659" r:id="rId4"/>
   </p:sldMasterIdLst>
@@ -16,22 +16,6 @@
   </p:sldIdLst>
   <p:sldSz cy="5143500" cx="9144000"/>
   <p:notesSz cx="6858000" cy="9144000"/>
-  <p:embeddedFontLst>
-    <p:embeddedFont>
-      <p:font typeface="Economica"/>
-      <p:regular r:id="rId11"/>
-      <p:bold r:id="rId12"/>
-      <p:italic r:id="rId13"/>
-      <p:boldItalic r:id="rId14"/>
-    </p:embeddedFont>
-    <p:embeddedFont>
-      <p:font typeface="Open Sans"/>
-      <p:regular r:id="rId15"/>
-      <p:bold r:id="rId16"/>
-      <p:italic r:id="rId17"/>
-      <p:boldItalic r:id="rId18"/>
-    </p:embeddedFont>
-  </p:embeddedFontLst>
   <p:defaultTextStyle>
     <a:defPPr lvl="0" marR="0" rtl="0" algn="l">
       <a:lnSpc>
@@ -6886,7 +6870,7 @@
         </p:nvSpPr>
         <p:spPr>
           <a:xfrm>
-            <a:off x="311700" y="1225225"/>
+            <a:off x="259900" y="1217825"/>
             <a:ext cx="8520600" cy="3354000"/>
           </a:xfrm>
           <a:prstGeom prst="rect">
@@ -7042,7 +7026,7 @@
             </a:pPr>
             <a:r>
               <a:rPr lang="en" sz="1500"/>
-              <a:t>Use one Javascript library, not used so far(may be Selenium).</a:t>
+              <a:t>Use one Javascript library, not used so far - Chart.js.</a:t>
             </a:r>
             <a:endParaRPr sz="1500"/>
           </a:p>
@@ -7454,7 +7438,7 @@
             </a:pPr>
             <a:r>
               <a:rPr lang="en"/>
-              <a:t>Overtime change in the number of students performance on county level.</a:t>
+              <a:t>Overtime change in the number of students performance on state level.</a:t>
             </a:r>
             <a:endParaRPr/>
           </a:p>

</xml_diff>